<commit_message>
Catch other mentions and update pictures
</commit_message>
<xml_diff>
--- a/static/originals/refguide/runtime-diagrams.pptx
+++ b/static/originals/refguide/runtime-diagrams.pptx
@@ -225,7 +225,7 @@
           <a:p>
             <a:fld id="{048BE5CF-3D99-4B85-885B-56B674E9D77C}" type="datetimeFigureOut">
               <a:rPr lang="en-US" smtClean="0"/>
-              <a:t>4/16/2020</a:t>
+              <a:t>3/15/2024</a:t>
             </a:fld>
             <a:endParaRPr lang="en-US"/>
           </a:p>
@@ -807,7 +807,7 @@
           <a:p>
             <a:fld id="{0FD70F0B-AE21-4F8D-A4A9-BFD22160883F}" type="datetimeFigureOut">
               <a:rPr lang="en-US" smtClean="0"/>
-              <a:t>4/16/2020</a:t>
+              <a:t>3/15/2024</a:t>
             </a:fld>
             <a:endParaRPr lang="en-US"/>
           </a:p>
@@ -1005,7 +1005,7 @@
           <a:p>
             <a:fld id="{0FD70F0B-AE21-4F8D-A4A9-BFD22160883F}" type="datetimeFigureOut">
               <a:rPr lang="en-US" smtClean="0"/>
-              <a:t>4/16/2020</a:t>
+              <a:t>3/15/2024</a:t>
             </a:fld>
             <a:endParaRPr lang="en-US"/>
           </a:p>
@@ -1213,7 +1213,7 @@
           <a:p>
             <a:fld id="{0FD70F0B-AE21-4F8D-A4A9-BFD22160883F}" type="datetimeFigureOut">
               <a:rPr lang="en-US" smtClean="0"/>
-              <a:t>4/16/2020</a:t>
+              <a:t>3/15/2024</a:t>
             </a:fld>
             <a:endParaRPr lang="en-US"/>
           </a:p>
@@ -1411,7 +1411,7 @@
           <a:p>
             <a:fld id="{0FD70F0B-AE21-4F8D-A4A9-BFD22160883F}" type="datetimeFigureOut">
               <a:rPr lang="en-US" smtClean="0"/>
-              <a:t>4/16/2020</a:t>
+              <a:t>3/15/2024</a:t>
             </a:fld>
             <a:endParaRPr lang="en-US"/>
           </a:p>
@@ -1686,7 +1686,7 @@
           <a:p>
             <a:fld id="{0FD70F0B-AE21-4F8D-A4A9-BFD22160883F}" type="datetimeFigureOut">
               <a:rPr lang="en-US" smtClean="0"/>
-              <a:t>4/16/2020</a:t>
+              <a:t>3/15/2024</a:t>
             </a:fld>
             <a:endParaRPr lang="en-US"/>
           </a:p>
@@ -1951,7 +1951,7 @@
           <a:p>
             <a:fld id="{0FD70F0B-AE21-4F8D-A4A9-BFD22160883F}" type="datetimeFigureOut">
               <a:rPr lang="en-US" smtClean="0"/>
-              <a:t>4/16/2020</a:t>
+              <a:t>3/15/2024</a:t>
             </a:fld>
             <a:endParaRPr lang="en-US"/>
           </a:p>
@@ -2363,7 +2363,7 @@
           <a:p>
             <a:fld id="{0FD70F0B-AE21-4F8D-A4A9-BFD22160883F}" type="datetimeFigureOut">
               <a:rPr lang="en-US" smtClean="0"/>
-              <a:t>4/16/2020</a:t>
+              <a:t>3/15/2024</a:t>
             </a:fld>
             <a:endParaRPr lang="en-US"/>
           </a:p>
@@ -2504,7 +2504,7 @@
           <a:p>
             <a:fld id="{0FD70F0B-AE21-4F8D-A4A9-BFD22160883F}" type="datetimeFigureOut">
               <a:rPr lang="en-US" smtClean="0"/>
-              <a:t>4/16/2020</a:t>
+              <a:t>3/15/2024</a:t>
             </a:fld>
             <a:endParaRPr lang="en-US"/>
           </a:p>
@@ -2617,7 +2617,7 @@
           <a:p>
             <a:fld id="{0FD70F0B-AE21-4F8D-A4A9-BFD22160883F}" type="datetimeFigureOut">
               <a:rPr lang="en-US" smtClean="0"/>
-              <a:t>4/16/2020</a:t>
+              <a:t>3/15/2024</a:t>
             </a:fld>
             <a:endParaRPr lang="en-US"/>
           </a:p>
@@ -2928,7 +2928,7 @@
           <a:p>
             <a:fld id="{0FD70F0B-AE21-4F8D-A4A9-BFD22160883F}" type="datetimeFigureOut">
               <a:rPr lang="en-US" smtClean="0"/>
-              <a:t>4/16/2020</a:t>
+              <a:t>3/15/2024</a:t>
             </a:fld>
             <a:endParaRPr lang="en-US"/>
           </a:p>
@@ -3216,7 +3216,7 @@
           <a:p>
             <a:fld id="{0FD70F0B-AE21-4F8D-A4A9-BFD22160883F}" type="datetimeFigureOut">
               <a:rPr lang="en-US" smtClean="0"/>
-              <a:t>4/16/2020</a:t>
+              <a:t>3/15/2024</a:t>
             </a:fld>
             <a:endParaRPr lang="en-US"/>
           </a:p>
@@ -3457,7 +3457,7 @@
           <a:p>
             <a:fld id="{0FD70F0B-AE21-4F8D-A4A9-BFD22160883F}" type="datetimeFigureOut">
               <a:rPr lang="en-US" smtClean="0"/>
-              <a:t>4/16/2020</a:t>
+              <a:t>3/15/2024</a:t>
             </a:fld>
             <a:endParaRPr lang="en-US"/>
           </a:p>
@@ -5388,14 +5388,16 @@
           <a:p>
             <a:pPr algn="ctr"/>
             <a:r>
-              <a:rPr lang="en-US" dirty="0"/>
-              <a:t>CDN </a:t>
-            </a:r>
-            <a:r>
-              <a:rPr lang="en-US" sz="900" dirty="0"/>
-              <a:t>Static Config</a:t>
-            </a:r>
-            <a:endParaRPr lang="en-US" dirty="0"/>
+              <a:rPr lang="en-US" sz="1400" dirty="0"/>
+              <a:t>Static</a:t>
+            </a:r>
+            <a:br>
+              <a:rPr lang="en-US" sz="1400" dirty="0"/>
+            </a:br>
+            <a:r>
+              <a:rPr lang="en-US" sz="1400" dirty="0"/>
+              <a:t>Content</a:t>
+            </a:r>
           </a:p>
         </p:txBody>
       </p:sp>

</xml_diff>